<commit_message>
Añadido lean canvas, metodologia scrum y edmodo (competencias)
</commit_message>
<xml_diff>
--- a/SDM/SDM Power.pptx
+++ b/SDM/SDM Power.pptx
@@ -14,7 +14,8 @@
     <p:sldId id="262" r:id="rId8"/>
     <p:sldId id="264" r:id="rId9"/>
     <p:sldId id="263" r:id="rId10"/>
-    <p:sldId id="265" r:id="rId11"/>
+    <p:sldId id="266" r:id="rId11"/>
+    <p:sldId id="265" r:id="rId12"/>
   </p:sldIdLst>
   <p:sldSz cx="12192000" cy="6858000"/>
   <p:notesSz cx="6858000" cy="9144000"/>
@@ -113,6 +114,11 @@
       </a:defRPr>
     </a:lvl9pPr>
   </p:defaultTextStyle>
+  <p:extLst>
+    <p:ext uri="{EFAFB233-063F-42B5-8137-9DF3F51BA10A}">
+      <p15:sldGuideLst xmlns:p15="http://schemas.microsoft.com/office/powerpoint/2012/main"/>
+    </p:ext>
+  </p:extLst>
 </p:presentation>
 </file>
 
@@ -3600,8 +3606,8 @@
     <dgm:cxn modelId="{BA8665DF-8944-4222-AFF0-FD4F832193CB}" srcId="{35014A15-A5C5-44FB-95EC-6351C351DEE6}" destId="{D6C5BC62-30AB-4612-A913-9532B7B01828}" srcOrd="0" destOrd="0" parTransId="{BA98FFC3-52B6-4A18-A781-D4DDB253163F}" sibTransId="{2D4EC8B9-62B6-49DA-A055-96BC2C0BF64C}"/>
     <dgm:cxn modelId="{FE1E2D2A-4EC0-4D5F-BAAB-167086BF0DEE}" srcId="{36AEA81C-F5AC-4E60-BE81-F2208808B7B1}" destId="{149D6836-A49A-4F1B-B68C-22D3CF37E4F2}" srcOrd="0" destOrd="0" parTransId="{43B9D291-FB5F-4C76-898E-25FFD2D38F3B}" sibTransId="{17F2705A-6774-47BD-87E6-7BFD2649FD23}"/>
     <dgm:cxn modelId="{0E526CEC-86FF-42A7-B5C2-7D2DE1981FC4}" type="presOf" srcId="{C12EC98E-73D7-46E3-8944-618552AD07D3}" destId="{4364CAA8-0DC0-4F35-BFC8-0EA917CB33CC}" srcOrd="0" destOrd="0" presId="urn:microsoft.com/office/officeart/2005/8/layout/vList5"/>
+    <dgm:cxn modelId="{45177D04-FA30-46DE-9263-D14B10062CBD}" type="presOf" srcId="{36AEA81C-F5AC-4E60-BE81-F2208808B7B1}" destId="{1406AF1D-0010-44B2-9DE3-BC3EC56337AC}" srcOrd="0" destOrd="0" presId="urn:microsoft.com/office/officeart/2005/8/layout/vList5"/>
     <dgm:cxn modelId="{1DFAC755-787C-45BE-90A3-03C58CE9D79C}" type="presOf" srcId="{6BEBCA42-5D04-403D-BD08-1611CE10C651}" destId="{8EEDF8ED-4F0A-434F-8E93-D518072807E9}" srcOrd="0" destOrd="0" presId="urn:microsoft.com/office/officeart/2005/8/layout/vList5"/>
-    <dgm:cxn modelId="{45177D04-FA30-46DE-9263-D14B10062CBD}" type="presOf" srcId="{36AEA81C-F5AC-4E60-BE81-F2208808B7B1}" destId="{1406AF1D-0010-44B2-9DE3-BC3EC56337AC}" srcOrd="0" destOrd="0" presId="urn:microsoft.com/office/officeart/2005/8/layout/vList5"/>
     <dgm:cxn modelId="{375C16E9-7C18-4AC4-BA1A-F81A96A3A2C9}" srcId="{36AEA81C-F5AC-4E60-BE81-F2208808B7B1}" destId="{19B32154-39B8-48F7-AAC7-9C2219509B67}" srcOrd="1" destOrd="0" parTransId="{5CCE8942-6097-479C-BCFE-7620523FBBB9}" sibTransId="{053D7024-4A2A-4B18-AE38-665B2CD61BBA}"/>
     <dgm:cxn modelId="{7CF656A9-DF68-4A4E-B3F7-3C9C0BF1DF11}" type="presOf" srcId="{3A592C80-33C6-4B76-8D74-F5EDA79BE3FF}" destId="{B568BB1A-4112-477F-9F96-DD47C5E435D2}" srcOrd="0" destOrd="1" presId="urn:microsoft.com/office/officeart/2005/8/layout/vList5"/>
     <dgm:cxn modelId="{F175DC01-B107-4C5A-9661-6DE3E0A0CFAA}" type="presOf" srcId="{35014A15-A5C5-44FB-95EC-6351C351DEE6}" destId="{B713DB9D-12F3-4E42-AEDF-2D3619B95DD9}" srcOrd="0" destOrd="0" presId="urn:microsoft.com/office/officeart/2005/8/layout/vList5"/>
@@ -11013,7 +11019,7 @@
           <a:p>
             <a:fld id="{7FD8BE86-4820-4BFA-8454-D067F4940AB4}" type="datetimeFigureOut">
               <a:rPr lang="es-ES" smtClean="0"/>
-              <a:t>31/10/2016</a:t>
+              <a:t>15/11/2016</a:t>
             </a:fld>
             <a:endParaRPr lang="es-ES"/>
           </a:p>
@@ -11224,7 +11230,7 @@
           <a:p>
             <a:fld id="{7FD8BE86-4820-4BFA-8454-D067F4940AB4}" type="datetimeFigureOut">
               <a:rPr lang="es-ES" smtClean="0"/>
-              <a:t>31/10/2016</a:t>
+              <a:t>15/11/2016</a:t>
             </a:fld>
             <a:endParaRPr lang="es-ES"/>
           </a:p>
@@ -11439,7 +11445,7 @@
           <a:p>
             <a:fld id="{7FD8BE86-4820-4BFA-8454-D067F4940AB4}" type="datetimeFigureOut">
               <a:rPr lang="es-ES" smtClean="0"/>
-              <a:t>31/10/2016</a:t>
+              <a:t>15/11/2016</a:t>
             </a:fld>
             <a:endParaRPr lang="es-ES"/>
           </a:p>
@@ -11640,7 +11646,7 @@
           <a:p>
             <a:fld id="{7FD8BE86-4820-4BFA-8454-D067F4940AB4}" type="datetimeFigureOut">
               <a:rPr lang="es-ES" smtClean="0"/>
-              <a:t>31/10/2016</a:t>
+              <a:t>15/11/2016</a:t>
             </a:fld>
             <a:endParaRPr lang="es-ES"/>
           </a:p>
@@ -11919,7 +11925,7 @@
           <a:p>
             <a:fld id="{7FD8BE86-4820-4BFA-8454-D067F4940AB4}" type="datetimeFigureOut">
               <a:rPr lang="es-ES" smtClean="0"/>
-              <a:t>31/10/2016</a:t>
+              <a:t>15/11/2016</a:t>
             </a:fld>
             <a:endParaRPr lang="es-ES"/>
           </a:p>
@@ -12187,7 +12193,7 @@
           <a:p>
             <a:fld id="{7FD8BE86-4820-4BFA-8454-D067F4940AB4}" type="datetimeFigureOut">
               <a:rPr lang="es-ES" smtClean="0"/>
-              <a:t>31/10/2016</a:t>
+              <a:t>15/11/2016</a:t>
             </a:fld>
             <a:endParaRPr lang="es-ES"/>
           </a:p>
@@ -12603,7 +12609,7 @@
           <a:p>
             <a:fld id="{7FD8BE86-4820-4BFA-8454-D067F4940AB4}" type="datetimeFigureOut">
               <a:rPr lang="es-ES" smtClean="0"/>
-              <a:t>31/10/2016</a:t>
+              <a:t>15/11/2016</a:t>
             </a:fld>
             <a:endParaRPr lang="es-ES"/>
           </a:p>
@@ -12752,7 +12758,7 @@
           <a:p>
             <a:fld id="{7FD8BE86-4820-4BFA-8454-D067F4940AB4}" type="datetimeFigureOut">
               <a:rPr lang="es-ES" smtClean="0"/>
-              <a:t>31/10/2016</a:t>
+              <a:t>15/11/2016</a:t>
             </a:fld>
             <a:endParaRPr lang="es-ES"/>
           </a:p>
@@ -12878,7 +12884,7 @@
           <a:p>
             <a:fld id="{7FD8BE86-4820-4BFA-8454-D067F4940AB4}" type="datetimeFigureOut">
               <a:rPr lang="es-ES" smtClean="0"/>
-              <a:t>31/10/2016</a:t>
+              <a:t>15/11/2016</a:t>
             </a:fld>
             <a:endParaRPr lang="es-ES"/>
           </a:p>
@@ -13129,7 +13135,7 @@
           <a:p>
             <a:fld id="{7FD8BE86-4820-4BFA-8454-D067F4940AB4}" type="datetimeFigureOut">
               <a:rPr lang="es-ES" smtClean="0"/>
-              <a:t>31/10/2016</a:t>
+              <a:t>15/11/2016</a:t>
             </a:fld>
             <a:endParaRPr lang="es-ES"/>
           </a:p>
@@ -13574,7 +13580,7 @@
           <a:p>
             <a:fld id="{7FD8BE86-4820-4BFA-8454-D067F4940AB4}" type="datetimeFigureOut">
               <a:rPr lang="es-ES" smtClean="0"/>
-              <a:t>31/10/2016</a:t>
+              <a:t>15/11/2016</a:t>
             </a:fld>
             <a:endParaRPr lang="es-ES"/>
           </a:p>
@@ -13900,7 +13906,7 @@
           <a:p>
             <a:fld id="{7FD8BE86-4820-4BFA-8454-D067F4940AB4}" type="datetimeFigureOut">
               <a:rPr lang="es-ES" smtClean="0"/>
-              <a:t>31/10/2016</a:t>
+              <a:t>15/11/2016</a:t>
             </a:fld>
             <a:endParaRPr lang="es-ES"/>
           </a:p>
@@ -14482,6 +14488,97 @@
             <p:ph type="title"/>
           </p:nvPr>
         </p:nvSpPr>
+        <p:spPr>
+          <a:xfrm>
+            <a:off x="1493783" y="818585"/>
+            <a:ext cx="9603275" cy="1049235"/>
+          </a:xfrm>
+        </p:spPr>
+        <p:txBody>
+          <a:bodyPr/>
+          <a:lstStyle/>
+          <a:p>
+            <a:r>
+              <a:rPr lang="es-ES" dirty="0"/>
+              <a:t>Estudio de la competencia</a:t>
+            </a:r>
+            <a:br>
+              <a:rPr lang="es-ES" dirty="0"/>
+            </a:br>
+            <a:endParaRPr lang="es-ES" dirty="0"/>
+          </a:p>
+        </p:txBody>
+      </p:sp>
+      <p:pic>
+        <p:nvPicPr>
+          <p:cNvPr id="5" name="Imagen 4"/>
+          <p:cNvPicPr>
+            <a:picLocks noChangeAspect="1"/>
+          </p:cNvPicPr>
+          <p:nvPr/>
+        </p:nvPicPr>
+        <p:blipFill>
+          <a:blip r:embed="rId2">
+            <a:extLst>
+              <a:ext uri="{28A0092B-C50C-407E-A947-70E740481C1C}">
+                <a14:useLocalDpi xmlns:a14="http://schemas.microsoft.com/office/drawing/2010/main" val="0"/>
+              </a:ext>
+            </a:extLst>
+          </a:blip>
+          <a:stretch>
+            <a:fillRect/>
+          </a:stretch>
+        </p:blipFill>
+        <p:spPr>
+          <a:xfrm>
+            <a:off x="2414040" y="2057934"/>
+            <a:ext cx="7762759" cy="3780377"/>
+          </a:xfrm>
+          <a:prstGeom prst="rect">
+            <a:avLst/>
+          </a:prstGeom>
+        </p:spPr>
+      </p:pic>
+    </p:spTree>
+    <p:extLst>
+      <p:ext uri="{BB962C8B-B14F-4D97-AF65-F5344CB8AC3E}">
+        <p14:creationId xmlns:p14="http://schemas.microsoft.com/office/powerpoint/2010/main" val="2529403918"/>
+      </p:ext>
+    </p:extLst>
+  </p:cSld>
+  <p:clrMapOvr>
+    <a:masterClrMapping/>
+  </p:clrMapOvr>
+</p:sld>
+</file>
+
+<file path=ppt/slides/slide11.xml><?xml version="1.0" encoding="utf-8"?>
+<p:sld xmlns:a="http://schemas.openxmlformats.org/drawingml/2006/main" xmlns:r="http://schemas.openxmlformats.org/officeDocument/2006/relationships" xmlns:p="http://schemas.openxmlformats.org/presentationml/2006/main">
+  <p:cSld>
+    <p:spTree>
+      <p:nvGrpSpPr>
+        <p:cNvPr id="1" name=""/>
+        <p:cNvGrpSpPr/>
+        <p:nvPr/>
+      </p:nvGrpSpPr>
+      <p:grpSpPr>
+        <a:xfrm>
+          <a:off x="0" y="0"/>
+          <a:ext cx="0" cy="0"/>
+          <a:chOff x="0" y="0"/>
+          <a:chExt cx="0" cy="0"/>
+        </a:xfrm>
+      </p:grpSpPr>
+      <p:sp>
+        <p:nvSpPr>
+          <p:cNvPr id="2" name="Título 1"/>
+          <p:cNvSpPr>
+            <a:spLocks noGrp="1"/>
+          </p:cNvSpPr>
+          <p:nvPr>
+            <p:ph type="title"/>
+          </p:nvPr>
+        </p:nvSpPr>
         <p:spPr/>
         <p:txBody>
           <a:bodyPr/>
@@ -14647,25 +14744,35 @@
           </a:p>
         </p:txBody>
       </p:sp>
-      <p:sp>
-        <p:nvSpPr>
-          <p:cNvPr id="3" name="Marcador de contenido 2"/>
-          <p:cNvSpPr>
-            <a:spLocks noGrp="1"/>
-          </p:cNvSpPr>
+      <p:pic>
+        <p:nvPicPr>
+          <p:cNvPr id="4" name="Marcador de contenido 3"/>
+          <p:cNvPicPr>
+            <a:picLocks noGrp="1" noChangeAspect="1"/>
+          </p:cNvPicPr>
           <p:nvPr>
             <p:ph idx="1"/>
           </p:nvPr>
-        </p:nvSpPr>
-        <p:spPr/>
-        <p:txBody>
-          <a:bodyPr/>
-          <a:lstStyle/>
-          <a:p>
-            <a:endParaRPr lang="es-ES"/>
-          </a:p>
-        </p:txBody>
-      </p:sp>
+        </p:nvPicPr>
+        <p:blipFill>
+          <a:blip r:embed="rId2">
+            <a:extLst>
+              <a:ext uri="{28A0092B-C50C-407E-A947-70E740481C1C}">
+                <a14:useLocalDpi xmlns:a14="http://schemas.microsoft.com/office/drawing/2010/main" val="0"/>
+              </a:ext>
+            </a:extLst>
+          </a:blip>
+          <a:stretch>
+            <a:fillRect/>
+          </a:stretch>
+        </p:blipFill>
+        <p:spPr>
+          <a:xfrm>
+            <a:off x="1955409" y="2016125"/>
+            <a:ext cx="8609428" cy="3864170"/>
+          </a:xfrm>
+        </p:spPr>
+      </p:pic>
     </p:spTree>
     <p:extLst>
       <p:ext uri="{BB962C8B-B14F-4D97-AF65-F5344CB8AC3E}">
@@ -14706,7 +14813,12 @@
             <p:ph type="title"/>
           </p:nvPr>
         </p:nvSpPr>
-        <p:spPr/>
+        <p:spPr>
+          <a:xfrm>
+            <a:off x="1451579" y="804520"/>
+            <a:ext cx="9603275" cy="616318"/>
+          </a:xfrm>
+        </p:spPr>
         <p:txBody>
           <a:bodyPr/>
           <a:lstStyle/>
@@ -14723,25 +14835,35 @@
           </a:p>
         </p:txBody>
       </p:sp>
-      <p:sp>
-        <p:nvSpPr>
-          <p:cNvPr id="3" name="Marcador de contenido 2"/>
-          <p:cNvSpPr>
-            <a:spLocks noGrp="1"/>
-          </p:cNvSpPr>
+      <p:pic>
+        <p:nvPicPr>
+          <p:cNvPr id="4" name="Marcador de contenido 3"/>
+          <p:cNvPicPr>
+            <a:picLocks noGrp="1" noChangeAspect="1"/>
+          </p:cNvPicPr>
           <p:nvPr>
             <p:ph idx="1"/>
           </p:nvPr>
-        </p:nvSpPr>
-        <p:spPr/>
-        <p:txBody>
-          <a:bodyPr/>
-          <a:lstStyle/>
-          <a:p>
-            <a:endParaRPr lang="es-ES"/>
-          </a:p>
-        </p:txBody>
-      </p:sp>
+        </p:nvPicPr>
+        <p:blipFill>
+          <a:blip r:embed="rId2">
+            <a:extLst>
+              <a:ext uri="{28A0092B-C50C-407E-A947-70E740481C1C}">
+                <a14:useLocalDpi xmlns:a14="http://schemas.microsoft.com/office/drawing/2010/main" val="0"/>
+              </a:ext>
+            </a:extLst>
+          </a:blip>
+          <a:stretch>
+            <a:fillRect/>
+          </a:stretch>
+        </p:blipFill>
+        <p:spPr>
+          <a:xfrm>
+            <a:off x="1451579" y="1523755"/>
+            <a:ext cx="9603275" cy="4553487"/>
+          </a:xfrm>
+        </p:spPr>
+      </p:pic>
     </p:spTree>
     <p:extLst>
       <p:ext uri="{BB962C8B-B14F-4D97-AF65-F5344CB8AC3E}">

</xml_diff>